<commit_message>
- Added ethics slides - Modified paths in Linear Models
</commit_message>
<xml_diff>
--- a/Linear Models/Linear_models.pptx
+++ b/Linear Models/Linear_models.pptx
@@ -272,7 +272,7 @@
           <a:p>
             <a:fld id="{12BB04F4-C842-4944-BB52-25F717F249E0}" type="datetimeFigureOut">
               <a:rPr lang="en-US" smtClean="0"/>
-              <a:t>4/27/2020</a:t>
+              <a:t>5/26/2020</a:t>
             </a:fld>
             <a:endParaRPr lang="en-US"/>
           </a:p>
@@ -449,7 +449,7 @@
           <a:p>
             <a:fld id="{67CC35CE-8C34-6944-B9CA-59AB7C150D91}" type="datetimeFigureOut">
               <a:rPr lang="en-US" smtClean="0"/>
-              <a:t>4/27/2020</a:t>
+              <a:t>5/26/2020</a:t>
             </a:fld>
             <a:endParaRPr lang="en-US"/>
           </a:p>
@@ -994,7 +994,7 @@
         <p:spPr>
           <a:xfrm>
             <a:off x="365124" y="457200"/>
-            <a:ext cx="3523400" cy="246221"/>
+            <a:ext cx="2047420" cy="246221"/>
           </a:xfrm>
           <a:prstGeom prst="rect">
             <a:avLst/>
@@ -1022,7 +1022,19 @@
               <a:rPr lang="en-US" sz="1600" dirty="0">
                 <a:latin typeface="Bahnschrift" panose="020B0502040204020203" pitchFamily="34" charset="0"/>
               </a:rPr>
-              <a:t>2019 Data Science Camp [Charlotte, NC]</a:t>
+              <a:t>20</a:t>
+            </a:r>
+            <a:r>
+              <a:rPr lang="ru-RU" sz="1600" dirty="0">
+                <a:latin typeface="Bahnschrift" panose="020B0502040204020203" pitchFamily="34" charset="0"/>
+              </a:rPr>
+              <a:t>20</a:t>
+            </a:r>
+            <a:r>
+              <a:rPr lang="en-US" sz="1600" dirty="0">
+                <a:latin typeface="Bahnschrift" panose="020B0502040204020203" pitchFamily="34" charset="0"/>
+              </a:rPr>
+              <a:t> Data Science Camp</a:t>
             </a:r>
           </a:p>
         </p:txBody>
@@ -5093,20 +5105,29 @@
           <a:p>
             <a:r>
               <a:rPr lang="en-US" dirty="0"/>
-              <a:t>June 26, 2019</a:t>
-            </a:r>
-          </a:p>
-          <a:p>
-            <a:r>
-              <a:rPr lang="en-US" dirty="0"/>
-              <a:t>Dmitrii Pianov</a:t>
-            </a:r>
-          </a:p>
-          <a:p>
-            <a:r>
-              <a:rPr lang="en-US" dirty="0"/>
-              <a:t>Benika Hall, Yimei Zia</a:t>
-            </a:r>
+              <a:t>[Date]</a:t>
+            </a:r>
+          </a:p>
+          <a:p>
+            <a:r>
+              <a:rPr lang="en-US" dirty="0"/>
+              <a:t>[Presenter 1]</a:t>
+            </a:r>
+          </a:p>
+          <a:p>
+            <a:r>
+              <a:rPr lang="en-US" dirty="0"/>
+              <a:t>[Presenter </a:t>
+            </a:r>
+            <a:r>
+              <a:rPr lang="ru-RU" dirty="0"/>
+              <a:t>2</a:t>
+            </a:r>
+            <a:r>
+              <a:rPr lang="en-US"/>
+              <a:t>]</a:t>
+            </a:r>
+            <a:endParaRPr lang="en-US" dirty="0"/>
           </a:p>
         </p:txBody>
       </p:sp>

</xml_diff>